<commit_message>
Os objetos de apresentação do motal foram configurados, porém, os dados que deveriam ser apresentados nas caixas de texto ainda não estão sendo trazidos, devido a sintaxe do razor, foi preciso reescrever o codigo direto no html para identificaçao dos actionLinks que chamam o controler do backend em C#. O script de apresentação de conteudo da tela foi nomeado como "exibir_form".
</commit_message>
<xml_diff>
--- a/ControleEstoque/ControleEstoque/Informações Adicionais da aplicação/Aulas controle de estoque C#.pptx
+++ b/ControleEstoque/ControleEstoque/Informações Adicionais da aplicação/Aulas controle de estoque C#.pptx
@@ -106,6 +106,11 @@
       </a:defRPr>
     </a:lvl9pPr>
   </p:defaultTextStyle>
+  <p:extLst>
+    <p:ext uri="{EFAFB233-063F-42B5-8137-9DF3F51BA10A}">
+      <p15:sldGuideLst xmlns:p15="http://schemas.microsoft.com/office/powerpoint/2012/main"/>
+    </p:ext>
+  </p:extLst>
 </p:presentation>
 </file>
 
@@ -256,7 +261,7 @@
           <a:p>
             <a:fld id="{30B80B70-A274-4C47-B36C-D81B46EA27ED}" type="datetimeFigureOut">
               <a:rPr lang="pt-BR" smtClean="0"/>
-              <a:t>27/05/2020</a:t>
+              <a:t>28/05/2020</a:t>
             </a:fld>
             <a:endParaRPr lang="pt-BR"/>
           </a:p>
@@ -454,7 +459,7 @@
           <a:p>
             <a:fld id="{30B80B70-A274-4C47-B36C-D81B46EA27ED}" type="datetimeFigureOut">
               <a:rPr lang="pt-BR" smtClean="0"/>
-              <a:t>27/05/2020</a:t>
+              <a:t>28/05/2020</a:t>
             </a:fld>
             <a:endParaRPr lang="pt-BR"/>
           </a:p>
@@ -662,7 +667,7 @@
           <a:p>
             <a:fld id="{30B80B70-A274-4C47-B36C-D81B46EA27ED}" type="datetimeFigureOut">
               <a:rPr lang="pt-BR" smtClean="0"/>
-              <a:t>27/05/2020</a:t>
+              <a:t>28/05/2020</a:t>
             </a:fld>
             <a:endParaRPr lang="pt-BR"/>
           </a:p>
@@ -860,7 +865,7 @@
           <a:p>
             <a:fld id="{30B80B70-A274-4C47-B36C-D81B46EA27ED}" type="datetimeFigureOut">
               <a:rPr lang="pt-BR" smtClean="0"/>
-              <a:t>27/05/2020</a:t>
+              <a:t>28/05/2020</a:t>
             </a:fld>
             <a:endParaRPr lang="pt-BR"/>
           </a:p>
@@ -1135,7 +1140,7 @@
           <a:p>
             <a:fld id="{30B80B70-A274-4C47-B36C-D81B46EA27ED}" type="datetimeFigureOut">
               <a:rPr lang="pt-BR" smtClean="0"/>
-              <a:t>27/05/2020</a:t>
+              <a:t>28/05/2020</a:t>
             </a:fld>
             <a:endParaRPr lang="pt-BR"/>
           </a:p>
@@ -1400,7 +1405,7 @@
           <a:p>
             <a:fld id="{30B80B70-A274-4C47-B36C-D81B46EA27ED}" type="datetimeFigureOut">
               <a:rPr lang="pt-BR" smtClean="0"/>
-              <a:t>27/05/2020</a:t>
+              <a:t>28/05/2020</a:t>
             </a:fld>
             <a:endParaRPr lang="pt-BR"/>
           </a:p>
@@ -1812,7 +1817,7 @@
           <a:p>
             <a:fld id="{30B80B70-A274-4C47-B36C-D81B46EA27ED}" type="datetimeFigureOut">
               <a:rPr lang="pt-BR" smtClean="0"/>
-              <a:t>27/05/2020</a:t>
+              <a:t>28/05/2020</a:t>
             </a:fld>
             <a:endParaRPr lang="pt-BR"/>
           </a:p>
@@ -1953,7 +1958,7 @@
           <a:p>
             <a:fld id="{30B80B70-A274-4C47-B36C-D81B46EA27ED}" type="datetimeFigureOut">
               <a:rPr lang="pt-BR" smtClean="0"/>
-              <a:t>27/05/2020</a:t>
+              <a:t>28/05/2020</a:t>
             </a:fld>
             <a:endParaRPr lang="pt-BR"/>
           </a:p>
@@ -2066,7 +2071,7 @@
           <a:p>
             <a:fld id="{30B80B70-A274-4C47-B36C-D81B46EA27ED}" type="datetimeFigureOut">
               <a:rPr lang="pt-BR" smtClean="0"/>
-              <a:t>27/05/2020</a:t>
+              <a:t>28/05/2020</a:t>
             </a:fld>
             <a:endParaRPr lang="pt-BR"/>
           </a:p>
@@ -2377,7 +2382,7 @@
           <a:p>
             <a:fld id="{30B80B70-A274-4C47-B36C-D81B46EA27ED}" type="datetimeFigureOut">
               <a:rPr lang="pt-BR" smtClean="0"/>
-              <a:t>27/05/2020</a:t>
+              <a:t>28/05/2020</a:t>
             </a:fld>
             <a:endParaRPr lang="pt-BR"/>
           </a:p>
@@ -2665,7 +2670,7 @@
           <a:p>
             <a:fld id="{30B80B70-A274-4C47-B36C-D81B46EA27ED}" type="datetimeFigureOut">
               <a:rPr lang="pt-BR" smtClean="0"/>
-              <a:t>27/05/2020</a:t>
+              <a:t>28/05/2020</a:t>
             </a:fld>
             <a:endParaRPr lang="pt-BR"/>
           </a:p>
@@ -2906,7 +2911,7 @@
           <a:p>
             <a:fld id="{30B80B70-A274-4C47-B36C-D81B46EA27ED}" type="datetimeFigureOut">
               <a:rPr lang="pt-BR" smtClean="0"/>
-              <a:t>27/05/2020</a:t>
+              <a:t>28/05/2020</a:t>
             </a:fld>
             <a:endParaRPr lang="pt-BR"/>
           </a:p>

</xml_diff>